<commit_message>
Update feature 6 of the feature page Update Issue 258
</commit_message>
<xml_diff>
--- a/doc/mockups/features-screenshots/feature6-Reports.pptx
+++ b/doc/mockups/features-screenshots/feature6-Reports.pptx
@@ -324,7 +324,7 @@
             <a:fld id="{B0544CA6-0BFF-4F49-885A-88A3CCAE5331}" type="datetimeFigureOut">
               <a:rPr lang="en-SG" smtClean="0"/>
               <a:pPr/>
-              <a:t>1/8/2012</a:t>
+              <a:t>7/8/2012</a:t>
             </a:fld>
             <a:endParaRPr lang="en-SG"/>
           </a:p>
@@ -491,7 +491,7 @@
             <a:fld id="{B0544CA6-0BFF-4F49-885A-88A3CCAE5331}" type="datetimeFigureOut">
               <a:rPr lang="en-SG" smtClean="0"/>
               <a:pPr/>
-              <a:t>1/8/2012</a:t>
+              <a:t>7/8/2012</a:t>
             </a:fld>
             <a:endParaRPr lang="en-SG"/>
           </a:p>
@@ -668,7 +668,7 @@
             <a:fld id="{B0544CA6-0BFF-4F49-885A-88A3CCAE5331}" type="datetimeFigureOut">
               <a:rPr lang="en-SG" smtClean="0"/>
               <a:pPr/>
-              <a:t>1/8/2012</a:t>
+              <a:t>7/8/2012</a:t>
             </a:fld>
             <a:endParaRPr lang="en-SG"/>
           </a:p>
@@ -835,7 +835,7 @@
             <a:fld id="{B0544CA6-0BFF-4F49-885A-88A3CCAE5331}" type="datetimeFigureOut">
               <a:rPr lang="en-SG" smtClean="0"/>
               <a:pPr/>
-              <a:t>1/8/2012</a:t>
+              <a:t>7/8/2012</a:t>
             </a:fld>
             <a:endParaRPr lang="en-SG"/>
           </a:p>
@@ -1078,7 +1078,7 @@
             <a:fld id="{B0544CA6-0BFF-4F49-885A-88A3CCAE5331}" type="datetimeFigureOut">
               <a:rPr lang="en-SG" smtClean="0"/>
               <a:pPr/>
-              <a:t>1/8/2012</a:t>
+              <a:t>7/8/2012</a:t>
             </a:fld>
             <a:endParaRPr lang="en-SG"/>
           </a:p>
@@ -1363,7 +1363,7 @@
             <a:fld id="{B0544CA6-0BFF-4F49-885A-88A3CCAE5331}" type="datetimeFigureOut">
               <a:rPr lang="en-SG" smtClean="0"/>
               <a:pPr/>
-              <a:t>1/8/2012</a:t>
+              <a:t>7/8/2012</a:t>
             </a:fld>
             <a:endParaRPr lang="en-SG"/>
           </a:p>
@@ -1782,7 +1782,7 @@
             <a:fld id="{B0544CA6-0BFF-4F49-885A-88A3CCAE5331}" type="datetimeFigureOut">
               <a:rPr lang="en-SG" smtClean="0"/>
               <a:pPr/>
-              <a:t>1/8/2012</a:t>
+              <a:t>7/8/2012</a:t>
             </a:fld>
             <a:endParaRPr lang="en-SG"/>
           </a:p>
@@ -1897,7 +1897,7 @@
             <a:fld id="{B0544CA6-0BFF-4F49-885A-88A3CCAE5331}" type="datetimeFigureOut">
               <a:rPr lang="en-SG" smtClean="0"/>
               <a:pPr/>
-              <a:t>1/8/2012</a:t>
+              <a:t>7/8/2012</a:t>
             </a:fld>
             <a:endParaRPr lang="en-SG"/>
           </a:p>
@@ -1989,7 +1989,7 @@
             <a:fld id="{B0544CA6-0BFF-4F49-885A-88A3CCAE5331}" type="datetimeFigureOut">
               <a:rPr lang="en-SG" smtClean="0"/>
               <a:pPr/>
-              <a:t>1/8/2012</a:t>
+              <a:t>7/8/2012</a:t>
             </a:fld>
             <a:endParaRPr lang="en-SG"/>
           </a:p>
@@ -2263,7 +2263,7 @@
             <a:fld id="{B0544CA6-0BFF-4F49-885A-88A3CCAE5331}" type="datetimeFigureOut">
               <a:rPr lang="en-SG" smtClean="0"/>
               <a:pPr/>
-              <a:t>1/8/2012</a:t>
+              <a:t>7/8/2012</a:t>
             </a:fld>
             <a:endParaRPr lang="en-SG"/>
           </a:p>
@@ -2513,7 +2513,7 @@
             <a:fld id="{B0544CA6-0BFF-4F49-885A-88A3CCAE5331}" type="datetimeFigureOut">
               <a:rPr lang="en-SG" smtClean="0"/>
               <a:pPr/>
-              <a:t>1/8/2012</a:t>
+              <a:t>7/8/2012</a:t>
             </a:fld>
             <a:endParaRPr lang="en-SG"/>
           </a:p>
@@ -2723,7 +2723,7 @@
             <a:fld id="{B0544CA6-0BFF-4F49-885A-88A3CCAE5331}" type="datetimeFigureOut">
               <a:rPr lang="en-SG" smtClean="0"/>
               <a:pPr/>
-              <a:t>1/8/2012</a:t>
+              <a:t>7/8/2012</a:t>
             </a:fld>
             <a:endParaRPr lang="en-SG"/>
           </a:p>
@@ -3096,7 +3096,7 @@
       </p:grpSpPr>
       <p:pic>
         <p:nvPicPr>
-          <p:cNvPr id="1027" name="Picture 3"/>
+          <p:cNvPr id="3" name="Picture 3"/>
           <p:cNvPicPr>
             <a:picLocks noChangeAspect="1" noChangeArrowheads="1"/>
           </p:cNvPicPr>
@@ -3111,8 +3111,8 @@
         </p:blipFill>
         <p:spPr bwMode="auto">
           <a:xfrm>
-            <a:off x="2520652" y="2880196"/>
-            <a:ext cx="5069946" cy="1991493"/>
+            <a:off x="2520652" y="2835517"/>
+            <a:ext cx="5040560" cy="1988895"/>
           </a:xfrm>
           <a:prstGeom prst="rect">
             <a:avLst/>
@@ -3128,7 +3128,7 @@
       </p:pic>
       <p:pic>
         <p:nvPicPr>
-          <p:cNvPr id="1026" name="Picture 2"/>
+          <p:cNvPr id="2" name="Picture 2"/>
           <p:cNvPicPr>
             <a:picLocks noChangeAspect="1" noChangeArrowheads="1"/>
           </p:cNvPicPr>
@@ -3144,7 +3144,7 @@
         <p:spPr bwMode="auto">
           <a:xfrm>
             <a:off x="2520652" y="431924"/>
-            <a:ext cx="5040560" cy="1989100"/>
+            <a:ext cx="5040560" cy="2038963"/>
           </a:xfrm>
           <a:prstGeom prst="rect">
             <a:avLst/>
@@ -3645,7 +3645,7 @@
     </p:spTree>
     <p:extLst>
       <p:ext uri="{BB962C8B-B14F-4D97-AF65-F5344CB8AC3E}">
-        <p14:creationId xmlns:p14="http://schemas.microsoft.com/office/powerpoint/2010/main" xmlns="" val="4266231211"/>
+        <p14:creationId xmlns="" xmlns:p14="http://schemas.microsoft.com/office/powerpoint/2010/main" val="4266231211"/>
       </p:ext>
     </p:extLst>
   </p:cSld>

</xml_diff>